<commit_message>
refs #166 * Software Architektur
</commit_message>
<xml_diff>
--- a/doc/05_Design/architektur_uebersicht.pptx
+++ b/doc/05_Design/architektur_uebersicht.pptx
@@ -290,7 +290,7 @@
               <a:rPr lang="de-CH" smtClean="0"/>
               <a:t>04.04.2011</a:t>
             </a:fld>
-            <a:endParaRPr lang="de-CH"/>
+            <a:endParaRPr lang="de-CH" dirty="0"/>
           </a:p>
         </p:txBody>
       </p:sp>
@@ -309,7 +309,7 @@
           <a:bodyPr/>
           <a:lstStyle/>
           <a:p>
-            <a:endParaRPr lang="de-CH"/>
+            <a:endParaRPr lang="de-CH" dirty="0"/>
           </a:p>
         </p:txBody>
       </p:sp>
@@ -332,7 +332,7 @@
               <a:rPr lang="de-CH" smtClean="0"/>
               <a:t>‹Nr.›</a:t>
             </a:fld>
-            <a:endParaRPr lang="de-CH"/>
+            <a:endParaRPr lang="de-CH" dirty="0"/>
           </a:p>
         </p:txBody>
       </p:sp>
@@ -460,7 +460,7 @@
               <a:rPr lang="de-CH" smtClean="0"/>
               <a:t>04.04.2011</a:t>
             </a:fld>
-            <a:endParaRPr lang="de-CH"/>
+            <a:endParaRPr lang="de-CH" dirty="0"/>
           </a:p>
         </p:txBody>
       </p:sp>
@@ -479,7 +479,7 @@
           <a:bodyPr/>
           <a:lstStyle/>
           <a:p>
-            <a:endParaRPr lang="de-CH"/>
+            <a:endParaRPr lang="de-CH" dirty="0"/>
           </a:p>
         </p:txBody>
       </p:sp>
@@ -502,7 +502,7 @@
               <a:rPr lang="de-CH" smtClean="0"/>
               <a:t>‹Nr.›</a:t>
             </a:fld>
-            <a:endParaRPr lang="de-CH"/>
+            <a:endParaRPr lang="de-CH" dirty="0"/>
           </a:p>
         </p:txBody>
       </p:sp>
@@ -640,7 +640,7 @@
               <a:rPr lang="de-CH" smtClean="0"/>
               <a:t>04.04.2011</a:t>
             </a:fld>
-            <a:endParaRPr lang="de-CH"/>
+            <a:endParaRPr lang="de-CH" dirty="0"/>
           </a:p>
         </p:txBody>
       </p:sp>
@@ -659,7 +659,7 @@
           <a:bodyPr/>
           <a:lstStyle/>
           <a:p>
-            <a:endParaRPr lang="de-CH"/>
+            <a:endParaRPr lang="de-CH" dirty="0"/>
           </a:p>
         </p:txBody>
       </p:sp>
@@ -682,7 +682,7 @@
               <a:rPr lang="de-CH" smtClean="0"/>
               <a:t>‹Nr.›</a:t>
             </a:fld>
-            <a:endParaRPr lang="de-CH"/>
+            <a:endParaRPr lang="de-CH" dirty="0"/>
           </a:p>
         </p:txBody>
       </p:sp>
@@ -810,7 +810,7 @@
               <a:rPr lang="de-CH" smtClean="0"/>
               <a:t>04.04.2011</a:t>
             </a:fld>
-            <a:endParaRPr lang="de-CH"/>
+            <a:endParaRPr lang="de-CH" dirty="0"/>
           </a:p>
         </p:txBody>
       </p:sp>
@@ -829,7 +829,7 @@
           <a:bodyPr/>
           <a:lstStyle/>
           <a:p>
-            <a:endParaRPr lang="de-CH"/>
+            <a:endParaRPr lang="de-CH" dirty="0"/>
           </a:p>
         </p:txBody>
       </p:sp>
@@ -852,7 +852,7 @@
               <a:rPr lang="de-CH" smtClean="0"/>
               <a:t>‹Nr.›</a:t>
             </a:fld>
-            <a:endParaRPr lang="de-CH"/>
+            <a:endParaRPr lang="de-CH" dirty="0"/>
           </a:p>
         </p:txBody>
       </p:sp>
@@ -1056,7 +1056,7 @@
               <a:rPr lang="de-CH" smtClean="0"/>
               <a:t>04.04.2011</a:t>
             </a:fld>
-            <a:endParaRPr lang="de-CH"/>
+            <a:endParaRPr lang="de-CH" dirty="0"/>
           </a:p>
         </p:txBody>
       </p:sp>
@@ -1075,7 +1075,7 @@
           <a:bodyPr/>
           <a:lstStyle/>
           <a:p>
-            <a:endParaRPr lang="de-CH"/>
+            <a:endParaRPr lang="de-CH" dirty="0"/>
           </a:p>
         </p:txBody>
       </p:sp>
@@ -1098,7 +1098,7 @@
               <a:rPr lang="de-CH" smtClean="0"/>
               <a:t>‹Nr.›</a:t>
             </a:fld>
-            <a:endParaRPr lang="de-CH"/>
+            <a:endParaRPr lang="de-CH" dirty="0"/>
           </a:p>
         </p:txBody>
       </p:sp>
@@ -1344,7 +1344,7 @@
               <a:rPr lang="de-CH" smtClean="0"/>
               <a:t>04.04.2011</a:t>
             </a:fld>
-            <a:endParaRPr lang="de-CH"/>
+            <a:endParaRPr lang="de-CH" dirty="0"/>
           </a:p>
         </p:txBody>
       </p:sp>
@@ -1363,7 +1363,7 @@
           <a:bodyPr/>
           <a:lstStyle/>
           <a:p>
-            <a:endParaRPr lang="de-CH"/>
+            <a:endParaRPr lang="de-CH" dirty="0"/>
           </a:p>
         </p:txBody>
       </p:sp>
@@ -1386,7 +1386,7 @@
               <a:rPr lang="de-CH" smtClean="0"/>
               <a:t>‹Nr.›</a:t>
             </a:fld>
-            <a:endParaRPr lang="de-CH"/>
+            <a:endParaRPr lang="de-CH" dirty="0"/>
           </a:p>
         </p:txBody>
       </p:sp>
@@ -1766,7 +1766,7 @@
               <a:rPr lang="de-CH" smtClean="0"/>
               <a:t>04.04.2011</a:t>
             </a:fld>
-            <a:endParaRPr lang="de-CH"/>
+            <a:endParaRPr lang="de-CH" dirty="0"/>
           </a:p>
         </p:txBody>
       </p:sp>
@@ -1785,7 +1785,7 @@
           <a:bodyPr/>
           <a:lstStyle/>
           <a:p>
-            <a:endParaRPr lang="de-CH"/>
+            <a:endParaRPr lang="de-CH" dirty="0"/>
           </a:p>
         </p:txBody>
       </p:sp>
@@ -1808,7 +1808,7 @@
               <a:rPr lang="de-CH" smtClean="0"/>
               <a:t>‹Nr.›</a:t>
             </a:fld>
-            <a:endParaRPr lang="de-CH"/>
+            <a:endParaRPr lang="de-CH" dirty="0"/>
           </a:p>
         </p:txBody>
       </p:sp>
@@ -1884,7 +1884,7 @@
               <a:rPr lang="de-CH" smtClean="0"/>
               <a:t>04.04.2011</a:t>
             </a:fld>
-            <a:endParaRPr lang="de-CH"/>
+            <a:endParaRPr lang="de-CH" dirty="0"/>
           </a:p>
         </p:txBody>
       </p:sp>
@@ -1903,7 +1903,7 @@
           <a:bodyPr/>
           <a:lstStyle/>
           <a:p>
-            <a:endParaRPr lang="de-CH"/>
+            <a:endParaRPr lang="de-CH" dirty="0"/>
           </a:p>
         </p:txBody>
       </p:sp>
@@ -1926,7 +1926,7 @@
               <a:rPr lang="de-CH" smtClean="0"/>
               <a:t>‹Nr.›</a:t>
             </a:fld>
-            <a:endParaRPr lang="de-CH"/>
+            <a:endParaRPr lang="de-CH" dirty="0"/>
           </a:p>
         </p:txBody>
       </p:sp>
@@ -1979,7 +1979,7 @@
               <a:rPr lang="de-CH" smtClean="0"/>
               <a:t>04.04.2011</a:t>
             </a:fld>
-            <a:endParaRPr lang="de-CH"/>
+            <a:endParaRPr lang="de-CH" dirty="0"/>
           </a:p>
         </p:txBody>
       </p:sp>
@@ -1998,7 +1998,7 @@
           <a:bodyPr/>
           <a:lstStyle/>
           <a:p>
-            <a:endParaRPr lang="de-CH"/>
+            <a:endParaRPr lang="de-CH" dirty="0"/>
           </a:p>
         </p:txBody>
       </p:sp>
@@ -2021,7 +2021,7 @@
               <a:rPr lang="de-CH" smtClean="0"/>
               <a:t>‹Nr.›</a:t>
             </a:fld>
-            <a:endParaRPr lang="de-CH"/>
+            <a:endParaRPr lang="de-CH" dirty="0"/>
           </a:p>
         </p:txBody>
       </p:sp>
@@ -2256,7 +2256,7 @@
               <a:rPr lang="de-CH" smtClean="0"/>
               <a:t>04.04.2011</a:t>
             </a:fld>
-            <a:endParaRPr lang="de-CH"/>
+            <a:endParaRPr lang="de-CH" dirty="0"/>
           </a:p>
         </p:txBody>
       </p:sp>
@@ -2275,7 +2275,7 @@
           <a:bodyPr/>
           <a:lstStyle/>
           <a:p>
-            <a:endParaRPr lang="de-CH"/>
+            <a:endParaRPr lang="de-CH" dirty="0"/>
           </a:p>
         </p:txBody>
       </p:sp>
@@ -2298,7 +2298,7 @@
               <a:rPr lang="de-CH" smtClean="0"/>
               <a:t>‹Nr.›</a:t>
             </a:fld>
-            <a:endParaRPr lang="de-CH"/>
+            <a:endParaRPr lang="de-CH" dirty="0"/>
           </a:p>
         </p:txBody>
       </p:sp>
@@ -2421,7 +2421,7 @@
             </a:lvl9pPr>
           </a:lstStyle>
           <a:p>
-            <a:endParaRPr lang="de-CH"/>
+            <a:endParaRPr lang="de-CH" dirty="0"/>
           </a:p>
         </p:txBody>
       </p:sp>
@@ -2509,7 +2509,7 @@
               <a:rPr lang="de-CH" smtClean="0"/>
               <a:t>04.04.2011</a:t>
             </a:fld>
-            <a:endParaRPr lang="de-CH"/>
+            <a:endParaRPr lang="de-CH" dirty="0"/>
           </a:p>
         </p:txBody>
       </p:sp>
@@ -2528,7 +2528,7 @@
           <a:bodyPr/>
           <a:lstStyle/>
           <a:p>
-            <a:endParaRPr lang="de-CH"/>
+            <a:endParaRPr lang="de-CH" dirty="0"/>
           </a:p>
         </p:txBody>
       </p:sp>
@@ -2551,7 +2551,7 @@
               <a:rPr lang="de-CH" smtClean="0"/>
               <a:t>‹Nr.›</a:t>
             </a:fld>
-            <a:endParaRPr lang="de-CH"/>
+            <a:endParaRPr lang="de-CH" dirty="0"/>
           </a:p>
         </p:txBody>
       </p:sp>
@@ -2722,7 +2722,7 @@
               <a:rPr lang="de-CH" smtClean="0"/>
               <a:t>04.04.2011</a:t>
             </a:fld>
-            <a:endParaRPr lang="de-CH"/>
+            <a:endParaRPr lang="de-CH" dirty="0"/>
           </a:p>
         </p:txBody>
       </p:sp>
@@ -2759,7 +2759,7 @@
             </a:lvl1pPr>
           </a:lstStyle>
           <a:p>
-            <a:endParaRPr lang="de-CH"/>
+            <a:endParaRPr lang="de-CH" dirty="0"/>
           </a:p>
         </p:txBody>
       </p:sp>
@@ -2800,7 +2800,7 @@
               <a:rPr lang="de-CH" smtClean="0"/>
               <a:t>‹Nr.›</a:t>
             </a:fld>
-            <a:endParaRPr lang="de-CH"/>
+            <a:endParaRPr lang="de-CH" dirty="0"/>
           </a:p>
         </p:txBody>
       </p:sp>
@@ -3161,47 +3161,8 @@
           <a:lstStyle/>
           <a:p>
             <a:r>
-              <a:rPr lang="de-CH" sz="1600" dirty="0" err="1" smtClean="0"/>
-              <a:t>Android</a:t>
-            </a:r>
-            <a:r>
               <a:rPr lang="de-CH" sz="1600" dirty="0" smtClean="0"/>
-              <a:t>-Client</a:t>
-            </a:r>
-          </a:p>
-        </p:txBody>
-      </p:sp>
-      <p:sp>
-        <p:nvSpPr>
-          <p:cNvPr id="23" name="Textfeld 22"/>
-          <p:cNvSpPr txBox="1"/>
-          <p:nvPr/>
-        </p:nvSpPr>
-        <p:spPr>
-          <a:xfrm>
-            <a:off x="5564682" y="4937737"/>
-            <a:ext cx="1109099" cy="461665"/>
-          </a:xfrm>
-          <a:prstGeom prst="rect">
-            <a:avLst/>
-          </a:prstGeom>
-          <a:noFill/>
-          <a:ln w="15875">
-            <a:solidFill>
-              <a:schemeClr val="accent3"/>
-            </a:solidFill>
-            <a:prstDash val="sysDash"/>
-          </a:ln>
-        </p:spPr>
-        <p:txBody>
-          <a:bodyPr wrap="square" rtlCol="0">
-            <a:spAutoFit/>
-          </a:bodyPr>
-          <a:lstStyle/>
-          <a:p>
-            <a:r>
-              <a:rPr lang="de-CH" sz="1200" dirty="0" smtClean="0"/>
-              <a:t>Aussendienstmitarbeiter</a:t>
+              <a:t>Android-Client</a:t>
             </a:r>
           </a:p>
         </p:txBody>
@@ -3293,8 +3254,8 @@
         </p:nvSpPr>
         <p:spPr>
           <a:xfrm>
-            <a:off x="3192890" y="2435593"/>
-            <a:ext cx="1638062" cy="364440"/>
+            <a:off x="3192890" y="2435592"/>
+            <a:ext cx="1638062" cy="561360"/>
           </a:xfrm>
           <a:prstGeom prst="roundRect">
             <a:avLst/>
@@ -3332,8 +3293,8 @@
           <a:p>
             <a:pPr algn="ctr"/>
             <a:r>
-              <a:rPr lang="de-CH" dirty="0" err="1" smtClean="0"/>
-              <a:t>Application</a:t>
+              <a:rPr lang="de-CH" dirty="0" smtClean="0"/>
+              <a:t>Ruby on Rails Application</a:t>
             </a:r>
             <a:endParaRPr lang="de-CH" dirty="0"/>
           </a:p>
@@ -3347,8 +3308,8 @@
         </p:nvSpPr>
         <p:spPr>
           <a:xfrm>
-            <a:off x="4355189" y="3938555"/>
-            <a:ext cx="1123978" cy="364440"/>
+            <a:off x="4355189" y="3861048"/>
+            <a:ext cx="1123978" cy="441947"/>
           </a:xfrm>
           <a:prstGeom prst="roundRect">
             <a:avLst/>
@@ -3386,8 +3347,8 @@
           <a:p>
             <a:pPr algn="ctr"/>
             <a:r>
-              <a:rPr lang="de-CH" sz="1500" dirty="0" err="1" smtClean="0"/>
-              <a:t>Application</a:t>
+              <a:rPr lang="de-CH" sz="1500" dirty="0" smtClean="0"/>
+              <a:t>Android Application</a:t>
             </a:r>
             <a:endParaRPr lang="de-CH" sz="1500" dirty="0"/>
           </a:p>
@@ -3472,8 +3433,8 @@
         </p:nvCxnSpPr>
         <p:spPr>
           <a:xfrm flipH="1" flipV="1">
-            <a:off x="4011921" y="2800033"/>
-            <a:ext cx="905257" cy="1138522"/>
+            <a:off x="4011921" y="2996952"/>
+            <a:ext cx="905257" cy="864096"/>
           </a:xfrm>
           <a:prstGeom prst="straightConnector1">
             <a:avLst/>
@@ -3501,45 +3462,6 @@
           </a:fontRef>
         </p:style>
       </p:cxnSp>
-      <p:cxnSp>
-        <p:nvCxnSpPr>
-          <p:cNvPr id="1061" name="Gerade Verbindung 1060"/>
-          <p:cNvCxnSpPr>
-            <a:stCxn id="23" idx="2"/>
-            <a:endCxn id="22" idx="3"/>
-          </p:cNvCxnSpPr>
-          <p:nvPr/>
-        </p:nvCxnSpPr>
-        <p:spPr>
-          <a:xfrm flipH="1">
-            <a:off x="5746467" y="5399402"/>
-            <a:ext cx="372765" cy="718666"/>
-          </a:xfrm>
-          <a:prstGeom prst="line">
-            <a:avLst/>
-          </a:prstGeom>
-          <a:ln w="15875">
-            <a:solidFill>
-              <a:schemeClr val="accent3"/>
-            </a:solidFill>
-            <a:prstDash val="sysDash"/>
-          </a:ln>
-        </p:spPr>
-        <p:style>
-          <a:lnRef idx="1">
-            <a:schemeClr val="accent1"/>
-          </a:lnRef>
-          <a:fillRef idx="0">
-            <a:schemeClr val="accent1"/>
-          </a:fillRef>
-          <a:effectRef idx="0">
-            <a:schemeClr val="accent1"/>
-          </a:effectRef>
-          <a:fontRef idx="minor">
-            <a:schemeClr val="tx1"/>
-          </a:fontRef>
-        </p:style>
-      </p:cxnSp>
       <p:sp>
         <p:nvSpPr>
           <p:cNvPr id="113" name="Abgerundetes Rechteck 112"/>
@@ -3548,8 +3470,8 @@
         </p:nvSpPr>
         <p:spPr>
           <a:xfrm>
-            <a:off x="2353177" y="3942378"/>
-            <a:ext cx="1123978" cy="364440"/>
+            <a:off x="2353177" y="3861048"/>
+            <a:ext cx="1123978" cy="445770"/>
           </a:xfrm>
           <a:prstGeom prst="roundRect">
             <a:avLst/>
@@ -3587,8 +3509,8 @@
           <a:p>
             <a:pPr algn="ctr"/>
             <a:r>
-              <a:rPr lang="de-CH" sz="1500" dirty="0" err="1" smtClean="0"/>
-              <a:t>Application</a:t>
+              <a:rPr lang="de-CH" sz="1500" dirty="0" smtClean="0"/>
+              <a:t>Browser</a:t>
             </a:r>
             <a:endParaRPr lang="de-CH" sz="1500" dirty="0"/>
           </a:p>
@@ -3605,8 +3527,8 @@
         </p:nvCxnSpPr>
         <p:spPr>
           <a:xfrm flipV="1">
-            <a:off x="2915166" y="2800033"/>
-            <a:ext cx="1096755" cy="1142345"/>
+            <a:off x="2915166" y="2996952"/>
+            <a:ext cx="1096755" cy="864096"/>
           </a:xfrm>
           <a:prstGeom prst="straightConnector1">
             <a:avLst/>

</xml_diff>

<commit_message>
refs #166 kleine Anpassungen
</commit_message>
<xml_diff>
--- a/doc/05_Design/architektur_uebersicht.pptx
+++ b/doc/05_Design/architektur_uebersicht.pptx
@@ -288,7 +288,7 @@
           <a:p>
             <a:fld id="{BBEB04F3-DFAF-46FA-9DA4-3DB6CF671638}" type="datetimeFigureOut">
               <a:rPr lang="de-CH" smtClean="0"/>
-              <a:t>05.04.2011</a:t>
+              <a:t>11.04.2011</a:t>
             </a:fld>
             <a:endParaRPr lang="de-CH" dirty="0"/>
           </a:p>
@@ -458,7 +458,7 @@
           <a:p>
             <a:fld id="{BBEB04F3-DFAF-46FA-9DA4-3DB6CF671638}" type="datetimeFigureOut">
               <a:rPr lang="de-CH" smtClean="0"/>
-              <a:t>05.04.2011</a:t>
+              <a:t>11.04.2011</a:t>
             </a:fld>
             <a:endParaRPr lang="de-CH" dirty="0"/>
           </a:p>
@@ -638,7 +638,7 @@
           <a:p>
             <a:fld id="{BBEB04F3-DFAF-46FA-9DA4-3DB6CF671638}" type="datetimeFigureOut">
               <a:rPr lang="de-CH" smtClean="0"/>
-              <a:t>05.04.2011</a:t>
+              <a:t>11.04.2011</a:t>
             </a:fld>
             <a:endParaRPr lang="de-CH" dirty="0"/>
           </a:p>
@@ -808,7 +808,7 @@
           <a:p>
             <a:fld id="{BBEB04F3-DFAF-46FA-9DA4-3DB6CF671638}" type="datetimeFigureOut">
               <a:rPr lang="de-CH" smtClean="0"/>
-              <a:t>05.04.2011</a:t>
+              <a:t>11.04.2011</a:t>
             </a:fld>
             <a:endParaRPr lang="de-CH" dirty="0"/>
           </a:p>
@@ -1054,7 +1054,7 @@
           <a:p>
             <a:fld id="{BBEB04F3-DFAF-46FA-9DA4-3DB6CF671638}" type="datetimeFigureOut">
               <a:rPr lang="de-CH" smtClean="0"/>
-              <a:t>05.04.2011</a:t>
+              <a:t>11.04.2011</a:t>
             </a:fld>
             <a:endParaRPr lang="de-CH" dirty="0"/>
           </a:p>
@@ -1342,7 +1342,7 @@
           <a:p>
             <a:fld id="{BBEB04F3-DFAF-46FA-9DA4-3DB6CF671638}" type="datetimeFigureOut">
               <a:rPr lang="de-CH" smtClean="0"/>
-              <a:t>05.04.2011</a:t>
+              <a:t>11.04.2011</a:t>
             </a:fld>
             <a:endParaRPr lang="de-CH" dirty="0"/>
           </a:p>
@@ -1764,7 +1764,7 @@
           <a:p>
             <a:fld id="{BBEB04F3-DFAF-46FA-9DA4-3DB6CF671638}" type="datetimeFigureOut">
               <a:rPr lang="de-CH" smtClean="0"/>
-              <a:t>05.04.2011</a:t>
+              <a:t>11.04.2011</a:t>
             </a:fld>
             <a:endParaRPr lang="de-CH" dirty="0"/>
           </a:p>
@@ -1882,7 +1882,7 @@
           <a:p>
             <a:fld id="{BBEB04F3-DFAF-46FA-9DA4-3DB6CF671638}" type="datetimeFigureOut">
               <a:rPr lang="de-CH" smtClean="0"/>
-              <a:t>05.04.2011</a:t>
+              <a:t>11.04.2011</a:t>
             </a:fld>
             <a:endParaRPr lang="de-CH" dirty="0"/>
           </a:p>
@@ -1977,7 +1977,7 @@
           <a:p>
             <a:fld id="{BBEB04F3-DFAF-46FA-9DA4-3DB6CF671638}" type="datetimeFigureOut">
               <a:rPr lang="de-CH" smtClean="0"/>
-              <a:t>05.04.2011</a:t>
+              <a:t>11.04.2011</a:t>
             </a:fld>
             <a:endParaRPr lang="de-CH" dirty="0"/>
           </a:p>
@@ -2254,7 +2254,7 @@
           <a:p>
             <a:fld id="{BBEB04F3-DFAF-46FA-9DA4-3DB6CF671638}" type="datetimeFigureOut">
               <a:rPr lang="de-CH" smtClean="0"/>
-              <a:t>05.04.2011</a:t>
+              <a:t>11.04.2011</a:t>
             </a:fld>
             <a:endParaRPr lang="de-CH" dirty="0"/>
           </a:p>
@@ -2507,7 +2507,7 @@
           <a:p>
             <a:fld id="{BBEB04F3-DFAF-46FA-9DA4-3DB6CF671638}" type="datetimeFigureOut">
               <a:rPr lang="de-CH" smtClean="0"/>
-              <a:t>05.04.2011</a:t>
+              <a:t>11.04.2011</a:t>
             </a:fld>
             <a:endParaRPr lang="de-CH" dirty="0"/>
           </a:p>
@@ -2720,7 +2720,7 @@
           <a:p>
             <a:fld id="{BBEB04F3-DFAF-46FA-9DA4-3DB6CF671638}" type="datetimeFigureOut">
               <a:rPr lang="de-CH" smtClean="0"/>
-              <a:t>05.04.2011</a:t>
+              <a:t>11.04.2011</a:t>
             </a:fld>
             <a:endParaRPr lang="de-CH" dirty="0"/>
           </a:p>
@@ -3095,813 +3095,827 @@
           <a:chExt cx="0" cy="0"/>
         </a:xfrm>
       </p:grpSpPr>
-      <p:pic>
-        <p:nvPicPr>
-          <p:cNvPr id="8" name="Grafik 7"/>
-          <p:cNvPicPr>
-            <a:picLocks noChangeAspect="1"/>
-          </p:cNvPicPr>
+      <p:grpSp>
+        <p:nvGrpSpPr>
+          <p:cNvPr id="2" name="Gruppieren 1"/>
+          <p:cNvGrpSpPr/>
           <p:nvPr/>
-        </p:nvPicPr>
-        <p:blipFill>
-          <a:blip r:embed="rId2" cstate="print">
+        </p:nvGrpSpPr>
+        <p:grpSpPr>
+          <a:xfrm>
+            <a:off x="2353177" y="684517"/>
+            <a:ext cx="4791477" cy="5602828"/>
+            <a:chOff x="2353177" y="684517"/>
+            <a:chExt cx="4791477" cy="5602828"/>
+          </a:xfrm>
+        </p:grpSpPr>
+        <p:pic>
+          <p:nvPicPr>
+            <p:cNvPr id="8" name="Grafik 7"/>
+            <p:cNvPicPr>
+              <a:picLocks noChangeAspect="1"/>
+            </p:cNvPicPr>
+            <p:nvPr/>
+          </p:nvPicPr>
+          <p:blipFill>
+            <a:blip r:embed="rId2" cstate="print">
+              <a:extLst>
+                <a:ext uri="{28A0092B-C50C-407E-A947-70E740481C1C}">
+                  <a14:useLocalDpi xmlns:a14="http://schemas.microsoft.com/office/drawing/2010/main" val="0"/>
+                </a:ext>
+              </a:extLst>
+            </a:blip>
+            <a:stretch>
+              <a:fillRect/>
+            </a:stretch>
+          </p:blipFill>
+          <p:spPr>
+            <a:xfrm>
+              <a:off x="4208428" y="4548194"/>
+              <a:ext cx="1420326" cy="1118507"/>
+            </a:xfrm>
+            <a:prstGeom prst="roundRect">
+              <a:avLst>
+                <a:gd name="adj" fmla="val 8594"/>
+              </a:avLst>
+            </a:prstGeom>
+            <a:solidFill>
+              <a:srgbClr val="FFFFFF">
+                <a:shade val="85000"/>
+              </a:srgbClr>
+            </a:solidFill>
+            <a:ln>
+              <a:noFill/>
+            </a:ln>
+            <a:effectLst>
+              <a:reflection blurRad="12700" stA="38000" endPos="28000" dist="5000" dir="5400000" sy="-100000" algn="bl" rotWithShape="0"/>
+            </a:effectLst>
+          </p:spPr>
+        </p:pic>
+        <p:sp>
+          <p:nvSpPr>
+            <p:cNvPr id="22" name="Textfeld 21"/>
+            <p:cNvSpPr txBox="1"/>
+            <p:nvPr/>
+          </p:nvSpPr>
+          <p:spPr>
+            <a:xfrm>
+              <a:off x="4355189" y="5948791"/>
+              <a:ext cx="1391278" cy="338554"/>
+            </a:xfrm>
+            <a:prstGeom prst="rect">
+              <a:avLst/>
+            </a:prstGeom>
+            <a:noFill/>
+          </p:spPr>
+          <p:txBody>
+            <a:bodyPr wrap="none" rtlCol="0">
+              <a:spAutoFit/>
+            </a:bodyPr>
+            <a:lstStyle/>
+            <a:p>
+              <a:r>
+                <a:rPr lang="de-CH" sz="1600" dirty="0" smtClean="0"/>
+                <a:t>Android-Client</a:t>
+              </a:r>
+            </a:p>
+          </p:txBody>
+        </p:sp>
+        <p:sp>
+          <p:nvSpPr>
+            <p:cNvPr id="27" name="Textfeld 26"/>
+            <p:cNvSpPr txBox="1"/>
+            <p:nvPr/>
+          </p:nvSpPr>
+          <p:spPr>
+            <a:xfrm>
+              <a:off x="2851862" y="684517"/>
+              <a:ext cx="1264100" cy="338554"/>
+            </a:xfrm>
+            <a:prstGeom prst="rect">
+              <a:avLst/>
+            </a:prstGeom>
+            <a:noFill/>
+          </p:spPr>
+          <p:txBody>
+            <a:bodyPr wrap="square" rtlCol="0">
+              <a:spAutoFit/>
+            </a:bodyPr>
+            <a:lstStyle/>
+            <a:p>
+              <a:r>
+                <a:rPr lang="de-CH" sz="1600" dirty="0" smtClean="0"/>
+                <a:t>Webserver</a:t>
+              </a:r>
+            </a:p>
+          </p:txBody>
+        </p:sp>
+        <p:pic>
+          <p:nvPicPr>
+            <p:cNvPr id="1028" name="Picture 4" descr="C:\Users\schefe\AppData\Local\Microsoft\Windows\Temporary Internet Files\Content.IE5\PFEG0HII\MC900434845[1].png"/>
+            <p:cNvPicPr>
+              <a:picLocks noChangeAspect="1" noChangeArrowheads="1"/>
+            </p:cNvPicPr>
+            <p:nvPr/>
+          </p:nvPicPr>
+          <p:blipFill>
+            <a:blip r:embed="rId3">
+              <a:extLst>
+                <a:ext uri="{28A0092B-C50C-407E-A947-70E740481C1C}">
+                  <a14:useLocalDpi xmlns:a14="http://schemas.microsoft.com/office/drawing/2010/main" val="0"/>
+                </a:ext>
+              </a:extLst>
+            </a:blip>
+            <a:srcRect/>
+            <a:stretch>
+              <a:fillRect/>
+            </a:stretch>
+          </p:blipFill>
+          <p:spPr bwMode="auto">
+            <a:xfrm>
+              <a:off x="3483912" y="956143"/>
+              <a:ext cx="1305193" cy="1305193"/>
+            </a:xfrm>
+            <a:prstGeom prst="rect">
+              <a:avLst/>
+            </a:prstGeom>
+            <a:ln>
+              <a:noFill/>
+            </a:ln>
+            <a:effectLst>
+              <a:outerShdw blurRad="292100" dist="139700" dir="2700000" algn="tl" rotWithShape="0">
+                <a:srgbClr val="333333">
+                  <a:alpha val="65000"/>
+                </a:srgbClr>
+              </a:outerShdw>
+            </a:effectLst>
             <a:extLst>
-              <a:ext uri="{28A0092B-C50C-407E-A947-70E740481C1C}">
-                <a14:useLocalDpi xmlns:a14="http://schemas.microsoft.com/office/drawing/2010/main" val="0"/>
+              <a:ext uri="{909E8E84-426E-40DD-AFC4-6F175D3DCCD1}">
+                <a14:hiddenFill xmlns:a14="http://schemas.microsoft.com/office/drawing/2010/main">
+                  <a:solidFill>
+                    <a:srgbClr val="FFFFFF"/>
+                  </a:solidFill>
+                </a14:hiddenFill>
               </a:ext>
             </a:extLst>
-          </a:blip>
-          <a:stretch>
-            <a:fillRect/>
-          </a:stretch>
-        </p:blipFill>
-        <p:spPr>
-          <a:xfrm>
-            <a:off x="4208428" y="4548194"/>
-            <a:ext cx="1420326" cy="1118507"/>
-          </a:xfrm>
-          <a:prstGeom prst="roundRect">
-            <a:avLst>
-              <a:gd name="adj" fmla="val 8594"/>
-            </a:avLst>
-          </a:prstGeom>
-          <a:solidFill>
-            <a:srgbClr val="FFFFFF">
-              <a:shade val="85000"/>
-            </a:srgbClr>
-          </a:solidFill>
-          <a:ln>
-            <a:noFill/>
-          </a:ln>
-          <a:effectLst>
-            <a:reflection blurRad="12700" stA="38000" endPos="28000" dist="5000" dir="5400000" sy="-100000" algn="bl" rotWithShape="0"/>
-          </a:effectLst>
-        </p:spPr>
-      </p:pic>
-      <p:sp>
-        <p:nvSpPr>
-          <p:cNvPr id="22" name="Textfeld 21"/>
-          <p:cNvSpPr txBox="1"/>
-          <p:nvPr/>
-        </p:nvSpPr>
-        <p:spPr>
-          <a:xfrm>
-            <a:off x="4355189" y="5948791"/>
-            <a:ext cx="1391278" cy="338554"/>
-          </a:xfrm>
-          <a:prstGeom prst="rect">
-            <a:avLst/>
-          </a:prstGeom>
-          <a:noFill/>
-        </p:spPr>
-        <p:txBody>
-          <a:bodyPr wrap="none" rtlCol="0">
-            <a:spAutoFit/>
-          </a:bodyPr>
-          <a:lstStyle/>
-          <a:p>
-            <a:r>
-              <a:rPr lang="de-CH" sz="1600" dirty="0" smtClean="0"/>
-              <a:t>Android-Client</a:t>
-            </a:r>
-          </a:p>
-        </p:txBody>
-      </p:sp>
-      <p:sp>
-        <p:nvSpPr>
-          <p:cNvPr id="27" name="Textfeld 26"/>
-          <p:cNvSpPr txBox="1"/>
-          <p:nvPr/>
-        </p:nvSpPr>
-        <p:spPr>
-          <a:xfrm>
-            <a:off x="2851862" y="684517"/>
-            <a:ext cx="1264100" cy="338554"/>
-          </a:xfrm>
-          <a:prstGeom prst="rect">
-            <a:avLst/>
-          </a:prstGeom>
-          <a:noFill/>
-        </p:spPr>
-        <p:txBody>
-          <a:bodyPr wrap="square" rtlCol="0">
-            <a:spAutoFit/>
-          </a:bodyPr>
-          <a:lstStyle/>
-          <a:p>
-            <a:r>
-              <a:rPr lang="de-CH" sz="1600" dirty="0" smtClean="0"/>
-              <a:t>Webserver</a:t>
-            </a:r>
-          </a:p>
-        </p:txBody>
-      </p:sp>
-      <p:pic>
-        <p:nvPicPr>
-          <p:cNvPr id="1028" name="Picture 4" descr="C:\Users\schefe\AppData\Local\Microsoft\Windows\Temporary Internet Files\Content.IE5\PFEG0HII\MC900434845[1].png"/>
-          <p:cNvPicPr>
-            <a:picLocks noChangeAspect="1" noChangeArrowheads="1"/>
-          </p:cNvPicPr>
-          <p:nvPr/>
-        </p:nvPicPr>
-        <p:blipFill>
-          <a:blip r:embed="rId3">
-            <a:extLst>
-              <a:ext uri="{28A0092B-C50C-407E-A947-70E740481C1C}">
-                <a14:useLocalDpi xmlns:a14="http://schemas.microsoft.com/office/drawing/2010/main" val="0"/>
-              </a:ext>
-            </a:extLst>
-          </a:blip>
-          <a:srcRect/>
-          <a:stretch>
-            <a:fillRect/>
-          </a:stretch>
-        </p:blipFill>
-        <p:spPr bwMode="auto">
-          <a:xfrm>
-            <a:off x="3483912" y="956143"/>
-            <a:ext cx="1305193" cy="1305193"/>
-          </a:xfrm>
-          <a:prstGeom prst="rect">
-            <a:avLst/>
-          </a:prstGeom>
-          <a:ln>
-            <a:noFill/>
-          </a:ln>
-          <a:effectLst>
-            <a:outerShdw blurRad="292100" dist="139700" dir="2700000" algn="tl" rotWithShape="0">
-              <a:srgbClr val="333333">
-                <a:alpha val="65000"/>
-              </a:srgbClr>
-            </a:outerShdw>
-          </a:effectLst>
-          <a:extLst>
-            <a:ext uri="{909E8E84-426E-40DD-AFC4-6F175D3DCCD1}">
-              <a14:hiddenFill xmlns:a14="http://schemas.microsoft.com/office/drawing/2010/main">
-                <a:solidFill>
-                  <a:srgbClr val="FFFFFF"/>
-                </a:solidFill>
-              </a14:hiddenFill>
-            </a:ext>
-          </a:extLst>
-        </p:spPr>
-      </p:pic>
-      <p:sp>
-        <p:nvSpPr>
-          <p:cNvPr id="1037" name="Abgerundetes Rechteck 1036"/>
-          <p:cNvSpPr/>
-          <p:nvPr/>
-        </p:nvSpPr>
-        <p:spPr>
-          <a:xfrm>
-            <a:off x="3192890" y="2435592"/>
-            <a:ext cx="1638062" cy="561360"/>
-          </a:xfrm>
-          <a:prstGeom prst="roundRect">
-            <a:avLst/>
-          </a:prstGeom>
-          <a:solidFill>
-            <a:schemeClr val="accent3"/>
-          </a:solidFill>
-          <a:ln>
-            <a:solidFill>
-              <a:schemeClr val="accent3">
-                <a:lumMod val="50000"/>
-              </a:schemeClr>
-            </a:solidFill>
-          </a:ln>
-        </p:spPr>
-        <p:style>
-          <a:lnRef idx="2">
-            <a:schemeClr val="accent1">
-              <a:shade val="50000"/>
-            </a:schemeClr>
-          </a:lnRef>
-          <a:fillRef idx="1">
-            <a:schemeClr val="accent1"/>
-          </a:fillRef>
-          <a:effectRef idx="0">
-            <a:schemeClr val="accent1"/>
-          </a:effectRef>
-          <a:fontRef idx="minor">
-            <a:schemeClr val="lt1"/>
-          </a:fontRef>
-        </p:style>
-        <p:txBody>
-          <a:bodyPr rtlCol="0" anchor="ctr"/>
-          <a:lstStyle/>
-          <a:p>
-            <a:pPr algn="ctr"/>
-            <a:r>
-              <a:rPr lang="de-CH" dirty="0" smtClean="0"/>
-              <a:t>Ruby on Rails Application</a:t>
-            </a:r>
-            <a:endParaRPr lang="de-CH" dirty="0"/>
-          </a:p>
-        </p:txBody>
-      </p:sp>
-      <p:sp>
-        <p:nvSpPr>
-          <p:cNvPr id="46" name="Abgerundetes Rechteck 45"/>
-          <p:cNvSpPr/>
-          <p:nvPr/>
-        </p:nvSpPr>
-        <p:spPr>
-          <a:xfrm>
-            <a:off x="4355189" y="3861048"/>
-            <a:ext cx="1123978" cy="441947"/>
-          </a:xfrm>
-          <a:prstGeom prst="roundRect">
-            <a:avLst/>
-          </a:prstGeom>
-          <a:solidFill>
-            <a:schemeClr val="accent3"/>
-          </a:solidFill>
-          <a:ln>
-            <a:solidFill>
-              <a:schemeClr val="accent3">
-                <a:lumMod val="50000"/>
-              </a:schemeClr>
-            </a:solidFill>
-          </a:ln>
-        </p:spPr>
-        <p:style>
-          <a:lnRef idx="2">
-            <a:schemeClr val="accent1">
-              <a:shade val="50000"/>
-            </a:schemeClr>
-          </a:lnRef>
-          <a:fillRef idx="1">
-            <a:schemeClr val="accent1"/>
-          </a:fillRef>
-          <a:effectRef idx="0">
-            <a:schemeClr val="accent1"/>
-          </a:effectRef>
-          <a:fontRef idx="minor">
-            <a:schemeClr val="lt1"/>
-          </a:fontRef>
-        </p:style>
-        <p:txBody>
-          <a:bodyPr rtlCol="0" anchor="ctr"/>
-          <a:lstStyle/>
-          <a:p>
-            <a:pPr algn="ctr"/>
-            <a:r>
-              <a:rPr lang="de-CH" sz="1500" dirty="0" smtClean="0"/>
-              <a:t>Android Application</a:t>
-            </a:r>
-            <a:endParaRPr lang="de-CH" sz="1500" dirty="0"/>
-          </a:p>
-        </p:txBody>
-      </p:sp>
-      <p:cxnSp>
-        <p:nvCxnSpPr>
-          <p:cNvPr id="1045" name="Gerade Verbindung 1044"/>
-          <p:cNvCxnSpPr>
-            <a:stCxn id="8" idx="0"/>
-            <a:endCxn id="46" idx="2"/>
-          </p:cNvCxnSpPr>
-          <p:nvPr/>
-        </p:nvCxnSpPr>
-        <p:spPr>
-          <a:xfrm flipH="1" flipV="1">
-            <a:off x="4917178" y="4302995"/>
-            <a:ext cx="1413" cy="245199"/>
-          </a:xfrm>
-          <a:prstGeom prst="line">
-            <a:avLst/>
-          </a:prstGeom>
-          <a:ln>
+          </p:spPr>
+        </p:pic>
+        <p:sp>
+          <p:nvSpPr>
+            <p:cNvPr id="1037" name="Abgerundetes Rechteck 1036"/>
+            <p:cNvSpPr/>
+            <p:nvPr/>
+          </p:nvSpPr>
+          <p:spPr>
+            <a:xfrm>
+              <a:off x="3192890" y="2435592"/>
+              <a:ext cx="1638062" cy="561360"/>
+            </a:xfrm>
+            <a:prstGeom prst="roundRect">
+              <a:avLst/>
+            </a:prstGeom>
             <a:solidFill>
               <a:schemeClr val="accent3"/>
             </a:solidFill>
-          </a:ln>
-        </p:spPr>
-        <p:style>
-          <a:lnRef idx="1">
-            <a:schemeClr val="accent1"/>
-          </a:lnRef>
-          <a:fillRef idx="0">
-            <a:schemeClr val="accent1"/>
-          </a:fillRef>
-          <a:effectRef idx="0">
-            <a:schemeClr val="accent1"/>
-          </a:effectRef>
-          <a:fontRef idx="minor">
-            <a:schemeClr val="tx1"/>
-          </a:fontRef>
-        </p:style>
-      </p:cxnSp>
-      <p:sp>
-        <p:nvSpPr>
-          <p:cNvPr id="1050" name="Textfeld 1049"/>
-          <p:cNvSpPr txBox="1"/>
-          <p:nvPr/>
-        </p:nvSpPr>
-        <p:spPr>
-          <a:xfrm>
-            <a:off x="4621089" y="3327747"/>
-            <a:ext cx="918428" cy="307777"/>
-          </a:xfrm>
-          <a:prstGeom prst="rect">
-            <a:avLst/>
-          </a:prstGeom>
-          <a:noFill/>
-        </p:spPr>
-        <p:txBody>
-          <a:bodyPr wrap="square" rtlCol="0">
-            <a:spAutoFit/>
-          </a:bodyPr>
-          <a:lstStyle/>
-          <a:p>
-            <a:r>
-              <a:rPr lang="de-CH" sz="1400" dirty="0" smtClean="0"/>
-              <a:t>HTTP 1.1</a:t>
-            </a:r>
-            <a:endParaRPr lang="de-CH" sz="1400" dirty="0"/>
-          </a:p>
-        </p:txBody>
-      </p:sp>
-      <p:cxnSp>
-        <p:nvCxnSpPr>
-          <p:cNvPr id="1059" name="Gerade Verbindung mit Pfeil 1058"/>
-          <p:cNvCxnSpPr>
-            <a:stCxn id="46" idx="0"/>
-            <a:endCxn id="1037" idx="2"/>
-          </p:cNvCxnSpPr>
-          <p:nvPr/>
-        </p:nvCxnSpPr>
-        <p:spPr>
-          <a:xfrm flipH="1" flipV="1">
-            <a:off x="4011921" y="2996952"/>
-            <a:ext cx="905257" cy="864096"/>
-          </a:xfrm>
-          <a:prstGeom prst="straightConnector1">
-            <a:avLst/>
-          </a:prstGeom>
-          <a:ln>
+            <a:ln>
+              <a:solidFill>
+                <a:schemeClr val="accent3">
+                  <a:lumMod val="50000"/>
+                </a:schemeClr>
+              </a:solidFill>
+            </a:ln>
+          </p:spPr>
+          <p:style>
+            <a:lnRef idx="2">
+              <a:schemeClr val="accent1">
+                <a:shade val="50000"/>
+              </a:schemeClr>
+            </a:lnRef>
+            <a:fillRef idx="1">
+              <a:schemeClr val="accent1"/>
+            </a:fillRef>
+            <a:effectRef idx="0">
+              <a:schemeClr val="accent1"/>
+            </a:effectRef>
+            <a:fontRef idx="minor">
+              <a:schemeClr val="lt1"/>
+            </a:fontRef>
+          </p:style>
+          <p:txBody>
+            <a:bodyPr rtlCol="0" anchor="ctr"/>
+            <a:lstStyle/>
+            <a:p>
+              <a:pPr algn="ctr"/>
+              <a:r>
+                <a:rPr lang="de-CH" dirty="0" smtClean="0"/>
+                <a:t>Ruby on Rails Application</a:t>
+              </a:r>
+              <a:endParaRPr lang="de-CH" dirty="0"/>
+            </a:p>
+          </p:txBody>
+        </p:sp>
+        <p:sp>
+          <p:nvSpPr>
+            <p:cNvPr id="46" name="Abgerundetes Rechteck 45"/>
+            <p:cNvSpPr/>
+            <p:nvPr/>
+          </p:nvSpPr>
+          <p:spPr>
+            <a:xfrm>
+              <a:off x="4355189" y="3861048"/>
+              <a:ext cx="1123978" cy="441947"/>
+            </a:xfrm>
+            <a:prstGeom prst="roundRect">
+              <a:avLst/>
+            </a:prstGeom>
             <a:solidFill>
               <a:schemeClr val="accent3"/>
             </a:solidFill>
-            <a:headEnd type="arrow"/>
-            <a:tailEnd type="arrow"/>
-          </a:ln>
-        </p:spPr>
-        <p:style>
-          <a:lnRef idx="1">
-            <a:schemeClr val="accent1"/>
-          </a:lnRef>
-          <a:fillRef idx="0">
-            <a:schemeClr val="accent1"/>
-          </a:fillRef>
-          <a:effectRef idx="0">
-            <a:schemeClr val="accent1"/>
-          </a:effectRef>
-          <a:fontRef idx="minor">
-            <a:schemeClr val="tx1"/>
-          </a:fontRef>
-        </p:style>
-      </p:cxnSp>
-      <p:sp>
-        <p:nvSpPr>
-          <p:cNvPr id="113" name="Abgerundetes Rechteck 112"/>
-          <p:cNvSpPr/>
-          <p:nvPr/>
-        </p:nvSpPr>
-        <p:spPr>
-          <a:xfrm>
-            <a:off x="2353177" y="3861048"/>
-            <a:ext cx="1123978" cy="445770"/>
-          </a:xfrm>
-          <a:prstGeom prst="roundRect">
-            <a:avLst/>
-          </a:prstGeom>
-          <a:solidFill>
-            <a:schemeClr val="accent3"/>
-          </a:solidFill>
-          <a:ln>
-            <a:solidFill>
-              <a:schemeClr val="accent3">
-                <a:lumMod val="50000"/>
+            <a:ln>
+              <a:solidFill>
+                <a:schemeClr val="accent3">
+                  <a:lumMod val="50000"/>
+                </a:schemeClr>
+              </a:solidFill>
+            </a:ln>
+          </p:spPr>
+          <p:style>
+            <a:lnRef idx="2">
+              <a:schemeClr val="accent1">
+                <a:shade val="50000"/>
               </a:schemeClr>
-            </a:solidFill>
-          </a:ln>
-        </p:spPr>
-        <p:style>
-          <a:lnRef idx="2">
-            <a:schemeClr val="accent1">
-              <a:shade val="50000"/>
-            </a:schemeClr>
-          </a:lnRef>
-          <a:fillRef idx="1">
-            <a:schemeClr val="accent1"/>
-          </a:fillRef>
-          <a:effectRef idx="0">
-            <a:schemeClr val="accent1"/>
-          </a:effectRef>
-          <a:fontRef idx="minor">
-            <a:schemeClr val="lt1"/>
-          </a:fontRef>
-        </p:style>
-        <p:txBody>
-          <a:bodyPr rtlCol="0" anchor="ctr"/>
-          <a:lstStyle/>
-          <a:p>
-            <a:pPr algn="ctr"/>
-            <a:r>
-              <a:rPr lang="de-CH" sz="1500" dirty="0" smtClean="0"/>
-              <a:t>Browser</a:t>
-            </a:r>
-            <a:endParaRPr lang="de-CH" sz="1500" dirty="0"/>
-          </a:p>
-        </p:txBody>
-      </p:sp>
-      <p:cxnSp>
-        <p:nvCxnSpPr>
-          <p:cNvPr id="107" name="Gerade Verbindung mit Pfeil 106"/>
-          <p:cNvCxnSpPr>
-            <a:stCxn id="113" idx="0"/>
-            <a:endCxn id="1037" idx="2"/>
-          </p:cNvCxnSpPr>
-          <p:nvPr/>
-        </p:nvCxnSpPr>
-        <p:spPr>
-          <a:xfrm flipV="1">
-            <a:off x="2915166" y="2996952"/>
-            <a:ext cx="1096755" cy="864096"/>
-          </a:xfrm>
-          <a:prstGeom prst="straightConnector1">
-            <a:avLst/>
-          </a:prstGeom>
-          <a:ln>
+            </a:lnRef>
+            <a:fillRef idx="1">
+              <a:schemeClr val="accent1"/>
+            </a:fillRef>
+            <a:effectRef idx="0">
+              <a:schemeClr val="accent1"/>
+            </a:effectRef>
+            <a:fontRef idx="minor">
+              <a:schemeClr val="lt1"/>
+            </a:fontRef>
+          </p:style>
+          <p:txBody>
+            <a:bodyPr rtlCol="0" anchor="ctr"/>
+            <a:lstStyle/>
+            <a:p>
+              <a:pPr algn="ctr"/>
+              <a:r>
+                <a:rPr lang="de-CH" sz="1500" dirty="0" smtClean="0"/>
+                <a:t>Android Application</a:t>
+              </a:r>
+              <a:endParaRPr lang="de-CH" sz="1500" dirty="0"/>
+            </a:p>
+          </p:txBody>
+        </p:sp>
+        <p:cxnSp>
+          <p:nvCxnSpPr>
+            <p:cNvPr id="1045" name="Gerade Verbindung 1044"/>
+            <p:cNvCxnSpPr>
+              <a:stCxn id="8" idx="0"/>
+              <a:endCxn id="46" idx="2"/>
+            </p:cNvCxnSpPr>
+            <p:nvPr/>
+          </p:nvCxnSpPr>
+          <p:spPr>
+            <a:xfrm flipH="1" flipV="1">
+              <a:off x="4917178" y="4302995"/>
+              <a:ext cx="1413" cy="245199"/>
+            </a:xfrm>
+            <a:prstGeom prst="line">
+              <a:avLst/>
+            </a:prstGeom>
+            <a:ln>
+              <a:solidFill>
+                <a:schemeClr val="accent3"/>
+              </a:solidFill>
+            </a:ln>
+          </p:spPr>
+          <p:style>
+            <a:lnRef idx="1">
+              <a:schemeClr val="accent1"/>
+            </a:lnRef>
+            <a:fillRef idx="0">
+              <a:schemeClr val="accent1"/>
+            </a:fillRef>
+            <a:effectRef idx="0">
+              <a:schemeClr val="accent1"/>
+            </a:effectRef>
+            <a:fontRef idx="minor">
+              <a:schemeClr val="tx1"/>
+            </a:fontRef>
+          </p:style>
+        </p:cxnSp>
+        <p:sp>
+          <p:nvSpPr>
+            <p:cNvPr id="1050" name="Textfeld 1049"/>
+            <p:cNvSpPr txBox="1"/>
+            <p:nvPr/>
+          </p:nvSpPr>
+          <p:spPr>
+            <a:xfrm>
+              <a:off x="4621089" y="3327747"/>
+              <a:ext cx="918428" cy="307777"/>
+            </a:xfrm>
+            <a:prstGeom prst="rect">
+              <a:avLst/>
+            </a:prstGeom>
+            <a:noFill/>
+          </p:spPr>
+          <p:txBody>
+            <a:bodyPr wrap="square" rtlCol="0">
+              <a:spAutoFit/>
+            </a:bodyPr>
+            <a:lstStyle/>
+            <a:p>
+              <a:r>
+                <a:rPr lang="de-CH" sz="1400" dirty="0" smtClean="0"/>
+                <a:t>HTTP 1.1</a:t>
+              </a:r>
+              <a:endParaRPr lang="de-CH" sz="1400" dirty="0"/>
+            </a:p>
+          </p:txBody>
+        </p:sp>
+        <p:cxnSp>
+          <p:nvCxnSpPr>
+            <p:cNvPr id="1059" name="Gerade Verbindung mit Pfeil 1058"/>
+            <p:cNvCxnSpPr>
+              <a:stCxn id="46" idx="0"/>
+              <a:endCxn id="1037" idx="2"/>
+            </p:cNvCxnSpPr>
+            <p:nvPr/>
+          </p:nvCxnSpPr>
+          <p:spPr>
+            <a:xfrm flipH="1" flipV="1">
+              <a:off x="4011921" y="2996952"/>
+              <a:ext cx="905257" cy="864096"/>
+            </a:xfrm>
+            <a:prstGeom prst="straightConnector1">
+              <a:avLst/>
+            </a:prstGeom>
+            <a:ln>
+              <a:solidFill>
+                <a:schemeClr val="accent3"/>
+              </a:solidFill>
+              <a:headEnd type="arrow"/>
+              <a:tailEnd type="arrow"/>
+            </a:ln>
+          </p:spPr>
+          <p:style>
+            <a:lnRef idx="1">
+              <a:schemeClr val="accent1"/>
+            </a:lnRef>
+            <a:fillRef idx="0">
+              <a:schemeClr val="accent1"/>
+            </a:fillRef>
+            <a:effectRef idx="0">
+              <a:schemeClr val="accent1"/>
+            </a:effectRef>
+            <a:fontRef idx="minor">
+              <a:schemeClr val="tx1"/>
+            </a:fontRef>
+          </p:style>
+        </p:cxnSp>
+        <p:sp>
+          <p:nvSpPr>
+            <p:cNvPr id="113" name="Abgerundetes Rechteck 112"/>
+            <p:cNvSpPr/>
+            <p:nvPr/>
+          </p:nvSpPr>
+          <p:spPr>
+            <a:xfrm>
+              <a:off x="2353177" y="3861048"/>
+              <a:ext cx="1123978" cy="445770"/>
+            </a:xfrm>
+            <a:prstGeom prst="roundRect">
+              <a:avLst/>
+            </a:prstGeom>
             <a:solidFill>
               <a:schemeClr val="accent3"/>
             </a:solidFill>
-            <a:headEnd type="arrow"/>
-            <a:tailEnd type="arrow"/>
-          </a:ln>
-        </p:spPr>
-        <p:style>
-          <a:lnRef idx="1">
-            <a:schemeClr val="accent1"/>
-          </a:lnRef>
-          <a:fillRef idx="0">
-            <a:schemeClr val="accent1"/>
-          </a:fillRef>
-          <a:effectRef idx="0">
-            <a:schemeClr val="accent1"/>
-          </a:effectRef>
-          <a:fontRef idx="minor">
-            <a:schemeClr val="tx1"/>
-          </a:fontRef>
-        </p:style>
-      </p:cxnSp>
-      <p:cxnSp>
-        <p:nvCxnSpPr>
-          <p:cNvPr id="112" name="Gerade Verbindung 111"/>
-          <p:cNvCxnSpPr>
-            <a:stCxn id="131" idx="0"/>
-            <a:endCxn id="113" idx="2"/>
-          </p:cNvCxnSpPr>
-          <p:nvPr/>
-        </p:nvCxnSpPr>
-        <p:spPr>
-          <a:xfrm flipH="1" flipV="1">
-            <a:off x="2915166" y="4306818"/>
-            <a:ext cx="4740" cy="277038"/>
-          </a:xfrm>
-          <a:prstGeom prst="line">
-            <a:avLst/>
-          </a:prstGeom>
-          <a:ln>
-            <a:solidFill>
-              <a:schemeClr val="accent3"/>
-            </a:solidFill>
-          </a:ln>
-        </p:spPr>
-        <p:style>
-          <a:lnRef idx="1">
-            <a:schemeClr val="accent1"/>
-          </a:lnRef>
-          <a:fillRef idx="0">
-            <a:schemeClr val="accent1"/>
-          </a:fillRef>
-          <a:effectRef idx="0">
-            <a:schemeClr val="accent1"/>
-          </a:effectRef>
-          <a:fontRef idx="minor">
-            <a:schemeClr val="tx1"/>
-          </a:fontRef>
-        </p:style>
-      </p:cxnSp>
-      <p:pic>
-        <p:nvPicPr>
-          <p:cNvPr id="114" name="Grafik 113"/>
-          <p:cNvPicPr>
-            <a:picLocks noChangeAspect="1"/>
-          </p:cNvPicPr>
-          <p:nvPr/>
-        </p:nvPicPr>
-        <p:blipFill>
-          <a:blip r:embed="rId4" cstate="print">
+            <a:ln>
+              <a:solidFill>
+                <a:schemeClr val="accent3">
+                  <a:lumMod val="50000"/>
+                </a:schemeClr>
+              </a:solidFill>
+            </a:ln>
+          </p:spPr>
+          <p:style>
+            <a:lnRef idx="2">
+              <a:schemeClr val="accent1">
+                <a:shade val="50000"/>
+              </a:schemeClr>
+            </a:lnRef>
+            <a:fillRef idx="1">
+              <a:schemeClr val="accent1"/>
+            </a:fillRef>
+            <a:effectRef idx="0">
+              <a:schemeClr val="accent1"/>
+            </a:effectRef>
+            <a:fontRef idx="minor">
+              <a:schemeClr val="lt1"/>
+            </a:fontRef>
+          </p:style>
+          <p:txBody>
+            <a:bodyPr rtlCol="0" anchor="ctr"/>
+            <a:lstStyle/>
+            <a:p>
+              <a:pPr algn="ctr"/>
+              <a:r>
+                <a:rPr lang="de-CH" sz="1500" dirty="0" smtClean="0"/>
+                <a:t>Browser</a:t>
+              </a:r>
+              <a:endParaRPr lang="de-CH" sz="1500" dirty="0"/>
+            </a:p>
+          </p:txBody>
+        </p:sp>
+        <p:cxnSp>
+          <p:nvCxnSpPr>
+            <p:cNvPr id="107" name="Gerade Verbindung mit Pfeil 106"/>
+            <p:cNvCxnSpPr>
+              <a:stCxn id="113" idx="0"/>
+              <a:endCxn id="1037" idx="2"/>
+            </p:cNvCxnSpPr>
+            <p:nvPr/>
+          </p:nvCxnSpPr>
+          <p:spPr>
+            <a:xfrm flipV="1">
+              <a:off x="2915166" y="2996952"/>
+              <a:ext cx="1096755" cy="864096"/>
+            </a:xfrm>
+            <a:prstGeom prst="straightConnector1">
+              <a:avLst/>
+            </a:prstGeom>
+            <a:ln>
+              <a:solidFill>
+                <a:schemeClr val="accent3"/>
+              </a:solidFill>
+              <a:headEnd type="arrow"/>
+              <a:tailEnd type="arrow"/>
+            </a:ln>
+          </p:spPr>
+          <p:style>
+            <a:lnRef idx="1">
+              <a:schemeClr val="accent1"/>
+            </a:lnRef>
+            <a:fillRef idx="0">
+              <a:schemeClr val="accent1"/>
+            </a:fillRef>
+            <a:effectRef idx="0">
+              <a:schemeClr val="accent1"/>
+            </a:effectRef>
+            <a:fontRef idx="minor">
+              <a:schemeClr val="tx1"/>
+            </a:fontRef>
+          </p:style>
+        </p:cxnSp>
+        <p:cxnSp>
+          <p:nvCxnSpPr>
+            <p:cNvPr id="112" name="Gerade Verbindung 111"/>
+            <p:cNvCxnSpPr>
+              <a:stCxn id="131" idx="0"/>
+              <a:endCxn id="113" idx="2"/>
+            </p:cNvCxnSpPr>
+            <p:nvPr/>
+          </p:nvCxnSpPr>
+          <p:spPr>
+            <a:xfrm flipH="1" flipV="1">
+              <a:off x="2915166" y="4306818"/>
+              <a:ext cx="4740" cy="277038"/>
+            </a:xfrm>
+            <a:prstGeom prst="line">
+              <a:avLst/>
+            </a:prstGeom>
+            <a:ln>
+              <a:solidFill>
+                <a:schemeClr val="accent3"/>
+              </a:solidFill>
+            </a:ln>
+          </p:spPr>
+          <p:style>
+            <a:lnRef idx="1">
+              <a:schemeClr val="accent1"/>
+            </a:lnRef>
+            <a:fillRef idx="0">
+              <a:schemeClr val="accent1"/>
+            </a:fillRef>
+            <a:effectRef idx="0">
+              <a:schemeClr val="accent1"/>
+            </a:effectRef>
+            <a:fontRef idx="minor">
+              <a:schemeClr val="tx1"/>
+            </a:fontRef>
+          </p:style>
+        </p:cxnSp>
+        <p:pic>
+          <p:nvPicPr>
+            <p:cNvPr id="114" name="Grafik 113"/>
+            <p:cNvPicPr>
+              <a:picLocks noChangeAspect="1"/>
+            </p:cNvPicPr>
+            <p:nvPr/>
+          </p:nvPicPr>
+          <p:blipFill>
+            <a:blip r:embed="rId4" cstate="print">
+              <a:extLst>
+                <a:ext uri="{28A0092B-C50C-407E-A947-70E740481C1C}">
+                  <a14:useLocalDpi xmlns:a14="http://schemas.microsoft.com/office/drawing/2010/main" val="0"/>
+                </a:ext>
+              </a:extLst>
+            </a:blip>
+            <a:stretch>
+              <a:fillRect/>
+            </a:stretch>
+          </p:blipFill>
+          <p:spPr>
+            <a:xfrm>
+              <a:off x="5564682" y="1186655"/>
+              <a:ext cx="764849" cy="844167"/>
+            </a:xfrm>
+            <a:prstGeom prst="rect">
+              <a:avLst/>
+            </a:prstGeom>
+          </p:spPr>
+        </p:pic>
+        <p:sp>
+          <p:nvSpPr>
+            <p:cNvPr id="147" name="Textfeld 146"/>
+            <p:cNvSpPr txBox="1"/>
+            <p:nvPr/>
+          </p:nvSpPr>
+          <p:spPr>
+            <a:xfrm>
+              <a:off x="5479167" y="775459"/>
+              <a:ext cx="1070252" cy="338554"/>
+            </a:xfrm>
+            <a:prstGeom prst="rect">
+              <a:avLst/>
+            </a:prstGeom>
+            <a:noFill/>
+          </p:spPr>
+          <p:txBody>
+            <a:bodyPr wrap="square" rtlCol="0">
+              <a:spAutoFit/>
+            </a:bodyPr>
+            <a:lstStyle/>
+            <a:p>
+              <a:r>
+                <a:rPr lang="de-CH" sz="1600" dirty="0" smtClean="0"/>
+                <a:t>Database</a:t>
+              </a:r>
+            </a:p>
+          </p:txBody>
+        </p:sp>
+        <p:cxnSp>
+          <p:nvCxnSpPr>
+            <p:cNvPr id="116" name="Gerade Verbindung 115"/>
+            <p:cNvCxnSpPr>
+              <a:stCxn id="1028" idx="3"/>
+              <a:endCxn id="114" idx="1"/>
+            </p:cNvCxnSpPr>
+            <p:nvPr/>
+          </p:nvCxnSpPr>
+          <p:spPr>
+            <a:xfrm flipV="1">
+              <a:off x="4789105" y="1608739"/>
+              <a:ext cx="775577" cy="1"/>
+            </a:xfrm>
+            <a:prstGeom prst="line">
+              <a:avLst/>
+            </a:prstGeom>
+            <a:ln>
+              <a:solidFill>
+                <a:schemeClr val="accent3"/>
+              </a:solidFill>
+            </a:ln>
+          </p:spPr>
+          <p:style>
+            <a:lnRef idx="1">
+              <a:schemeClr val="accent1"/>
+            </a:lnRef>
+            <a:fillRef idx="0">
+              <a:schemeClr val="accent1"/>
+            </a:fillRef>
+            <a:effectRef idx="0">
+              <a:schemeClr val="accent1"/>
+            </a:effectRef>
+            <a:fontRef idx="minor">
+              <a:schemeClr val="tx1"/>
+            </a:fontRef>
+          </p:style>
+        </p:cxnSp>
+        <p:sp>
+          <p:nvSpPr>
+            <p:cNvPr id="159" name="Textfeld 158"/>
+            <p:cNvSpPr txBox="1"/>
+            <p:nvPr/>
+          </p:nvSpPr>
+          <p:spPr>
+            <a:xfrm>
+              <a:off x="2543492" y="3299208"/>
+              <a:ext cx="918428" cy="307777"/>
+            </a:xfrm>
+            <a:prstGeom prst="rect">
+              <a:avLst/>
+            </a:prstGeom>
+            <a:noFill/>
+          </p:spPr>
+          <p:txBody>
+            <a:bodyPr wrap="square" rtlCol="0">
+              <a:spAutoFit/>
+            </a:bodyPr>
+            <a:lstStyle/>
+            <a:p>
+              <a:r>
+                <a:rPr lang="de-CH" sz="1400" dirty="0" smtClean="0"/>
+                <a:t>HTTP 1.1</a:t>
+              </a:r>
+              <a:endParaRPr lang="de-CH" sz="1400" dirty="0"/>
+            </a:p>
+          </p:txBody>
+        </p:sp>
+        <p:pic>
+          <p:nvPicPr>
+            <p:cNvPr id="131" name="Picture 7" descr="C:\Users\schefe\AppData\Local\Microsoft\Windows\Temporary Internet Files\Content.IE5\PFEG0HII\MC900310822[1].wmf"/>
+            <p:cNvPicPr>
+              <a:picLocks noChangeAspect="1" noChangeArrowheads="1"/>
+            </p:cNvPicPr>
+            <p:nvPr/>
+          </p:nvPicPr>
+          <p:blipFill>
+            <a:blip r:embed="rId5" cstate="print">
+              <a:extLst>
+                <a:ext uri="{28A0092B-C50C-407E-A947-70E740481C1C}">
+                  <a14:useLocalDpi xmlns:a14="http://schemas.microsoft.com/office/drawing/2010/main" val="0"/>
+                </a:ext>
+              </a:extLst>
+            </a:blip>
+            <a:srcRect/>
+            <a:stretch>
+              <a:fillRect/>
+            </a:stretch>
+          </p:blipFill>
+          <p:spPr bwMode="auto">
+            <a:xfrm>
+              <a:off x="2368243" y="4583856"/>
+              <a:ext cx="1103325" cy="1169429"/>
+            </a:xfrm>
+            <a:prstGeom prst="rect">
+              <a:avLst/>
+            </a:prstGeom>
+            <a:ln>
+              <a:noFill/>
+            </a:ln>
+            <a:effectLst>
+              <a:outerShdw blurRad="292100" dist="139700" dir="2700000" algn="tl" rotWithShape="0">
+                <a:srgbClr val="333333">
+                  <a:alpha val="65000"/>
+                </a:srgbClr>
+              </a:outerShdw>
+            </a:effectLst>
             <a:extLst>
-              <a:ext uri="{28A0092B-C50C-407E-A947-70E740481C1C}">
-                <a14:useLocalDpi xmlns:a14="http://schemas.microsoft.com/office/drawing/2010/main" val="0"/>
+              <a:ext uri="{909E8E84-426E-40DD-AFC4-6F175D3DCCD1}">
+                <a14:hiddenFill xmlns:a14="http://schemas.microsoft.com/office/drawing/2010/main">
+                  <a:solidFill>
+                    <a:srgbClr val="FFFFFF"/>
+                  </a:solidFill>
+                </a14:hiddenFill>
               </a:ext>
             </a:extLst>
-          </a:blip>
-          <a:stretch>
-            <a:fillRect/>
-          </a:stretch>
-        </p:blipFill>
-        <p:spPr>
-          <a:xfrm>
-            <a:off x="5564682" y="1186655"/>
-            <a:ext cx="764849" cy="844167"/>
-          </a:xfrm>
-          <a:prstGeom prst="rect">
-            <a:avLst/>
-          </a:prstGeom>
-        </p:spPr>
-      </p:pic>
-      <p:sp>
-        <p:nvSpPr>
-          <p:cNvPr id="147" name="Textfeld 146"/>
-          <p:cNvSpPr txBox="1"/>
-          <p:nvPr/>
-        </p:nvSpPr>
-        <p:spPr>
-          <a:xfrm>
-            <a:off x="5479167" y="775459"/>
-            <a:ext cx="1070252" cy="338554"/>
-          </a:xfrm>
-          <a:prstGeom prst="rect">
-            <a:avLst/>
-          </a:prstGeom>
-          <a:noFill/>
-        </p:spPr>
-        <p:txBody>
-          <a:bodyPr wrap="square" rtlCol="0">
-            <a:spAutoFit/>
-          </a:bodyPr>
-          <a:lstStyle/>
-          <a:p>
-            <a:r>
-              <a:rPr lang="de-CH" sz="1600" dirty="0" smtClean="0"/>
-              <a:t>Database</a:t>
-            </a:r>
-          </a:p>
-        </p:txBody>
-      </p:sp>
-      <p:cxnSp>
-        <p:nvCxnSpPr>
-          <p:cNvPr id="116" name="Gerade Verbindung 115"/>
-          <p:cNvCxnSpPr>
-            <a:stCxn id="1028" idx="3"/>
-            <a:endCxn id="114" idx="1"/>
-          </p:cNvCxnSpPr>
-          <p:nvPr/>
-        </p:nvCxnSpPr>
-        <p:spPr>
-          <a:xfrm flipV="1">
-            <a:off x="4789105" y="1608739"/>
-            <a:ext cx="775577" cy="1"/>
-          </a:xfrm>
-          <a:prstGeom prst="line">
-            <a:avLst/>
-          </a:prstGeom>
-          <a:ln>
-            <a:solidFill>
-              <a:schemeClr val="accent3"/>
-            </a:solidFill>
-          </a:ln>
-        </p:spPr>
-        <p:style>
-          <a:lnRef idx="1">
-            <a:schemeClr val="accent1"/>
-          </a:lnRef>
-          <a:fillRef idx="0">
-            <a:schemeClr val="accent1"/>
-          </a:fillRef>
-          <a:effectRef idx="0">
-            <a:schemeClr val="accent1"/>
-          </a:effectRef>
-          <a:fontRef idx="minor">
-            <a:schemeClr val="tx1"/>
-          </a:fontRef>
-        </p:style>
-      </p:cxnSp>
-      <p:sp>
-        <p:nvSpPr>
-          <p:cNvPr id="159" name="Textfeld 158"/>
-          <p:cNvSpPr txBox="1"/>
-          <p:nvPr/>
-        </p:nvSpPr>
-        <p:spPr>
-          <a:xfrm>
-            <a:off x="2543492" y="3299208"/>
-            <a:ext cx="918428" cy="307777"/>
-          </a:xfrm>
-          <a:prstGeom prst="rect">
-            <a:avLst/>
-          </a:prstGeom>
-          <a:noFill/>
-        </p:spPr>
-        <p:txBody>
-          <a:bodyPr wrap="square" rtlCol="0">
-            <a:spAutoFit/>
-          </a:bodyPr>
-          <a:lstStyle/>
-          <a:p>
-            <a:r>
-              <a:rPr lang="de-CH" sz="1400" dirty="0" smtClean="0"/>
-              <a:t>HTTP 1.1</a:t>
-            </a:r>
-            <a:endParaRPr lang="de-CH" sz="1400" dirty="0"/>
-          </a:p>
-        </p:txBody>
-      </p:sp>
-      <p:pic>
-        <p:nvPicPr>
-          <p:cNvPr id="131" name="Picture 7" descr="C:\Users\schefe\AppData\Local\Microsoft\Windows\Temporary Internet Files\Content.IE5\PFEG0HII\MC900310822[1].wmf"/>
-          <p:cNvPicPr>
-            <a:picLocks noChangeAspect="1" noChangeArrowheads="1"/>
-          </p:cNvPicPr>
-          <p:nvPr/>
-        </p:nvPicPr>
-        <p:blipFill>
-          <a:blip r:embed="rId5" cstate="print">
-            <a:extLst>
-              <a:ext uri="{28A0092B-C50C-407E-A947-70E740481C1C}">
-                <a14:useLocalDpi xmlns:a14="http://schemas.microsoft.com/office/drawing/2010/main" val="0"/>
-              </a:ext>
-            </a:extLst>
-          </a:blip>
-          <a:srcRect/>
-          <a:stretch>
-            <a:fillRect/>
-          </a:stretch>
-        </p:blipFill>
-        <p:spPr bwMode="auto">
-          <a:xfrm>
-            <a:off x="2368243" y="4583856"/>
-            <a:ext cx="1103325" cy="1169429"/>
-          </a:xfrm>
-          <a:prstGeom prst="rect">
-            <a:avLst/>
-          </a:prstGeom>
-          <a:ln>
+          </p:spPr>
+        </p:pic>
+        <p:sp>
+          <p:nvSpPr>
+            <p:cNvPr id="177" name="Textfeld 176"/>
+            <p:cNvSpPr txBox="1"/>
+            <p:nvPr/>
+          </p:nvSpPr>
+          <p:spPr>
+            <a:xfrm>
+              <a:off x="2514740" y="5926951"/>
+              <a:ext cx="940963" cy="338554"/>
+            </a:xfrm>
+            <a:prstGeom prst="rect">
+              <a:avLst/>
+            </a:prstGeom>
             <a:noFill/>
-          </a:ln>
-          <a:effectLst>
-            <a:outerShdw blurRad="292100" dist="139700" dir="2700000" algn="tl" rotWithShape="0">
-              <a:srgbClr val="333333">
-                <a:alpha val="65000"/>
-              </a:srgbClr>
-            </a:outerShdw>
-          </a:effectLst>
-          <a:extLst>
-            <a:ext uri="{909E8E84-426E-40DD-AFC4-6F175D3DCCD1}">
-              <a14:hiddenFill xmlns:a14="http://schemas.microsoft.com/office/drawing/2010/main">
-                <a:solidFill>
-                  <a:srgbClr val="FFFFFF"/>
-                </a:solidFill>
-              </a14:hiddenFill>
-            </a:ext>
-          </a:extLst>
-        </p:spPr>
-      </p:pic>
-      <p:sp>
-        <p:nvSpPr>
-          <p:cNvPr id="177" name="Textfeld 176"/>
-          <p:cNvSpPr txBox="1"/>
-          <p:nvPr/>
-        </p:nvSpPr>
-        <p:spPr>
-          <a:xfrm>
-            <a:off x="2514740" y="5926951"/>
-            <a:ext cx="940963" cy="338554"/>
-          </a:xfrm>
-          <a:prstGeom prst="rect">
-            <a:avLst/>
-          </a:prstGeom>
-          <a:noFill/>
-        </p:spPr>
-        <p:txBody>
-          <a:bodyPr wrap="none" rtlCol="0">
-            <a:spAutoFit/>
-          </a:bodyPr>
-          <a:lstStyle/>
-          <a:p>
-            <a:r>
-              <a:rPr lang="de-CH" sz="1600" dirty="0" smtClean="0"/>
-              <a:t>PC-Client</a:t>
-            </a:r>
-          </a:p>
-        </p:txBody>
-      </p:sp>
-      <p:pic>
-        <p:nvPicPr>
-          <p:cNvPr id="20" name="Grafik 19"/>
-          <p:cNvPicPr>
-            <a:picLocks noChangeAspect="1"/>
-          </p:cNvPicPr>
-          <p:nvPr/>
-        </p:nvPicPr>
-        <p:blipFill>
-          <a:blip r:embed="rId6" cstate="print">
-            <a:extLst>
-              <a:ext uri="{28A0092B-C50C-407E-A947-70E740481C1C}">
-                <a14:useLocalDpi xmlns:a14="http://schemas.microsoft.com/office/drawing/2010/main" val="0"/>
-              </a:ext>
-            </a:extLst>
-          </a:blip>
-          <a:stretch>
-            <a:fillRect/>
-          </a:stretch>
-        </p:blipFill>
-        <p:spPr>
-          <a:xfrm>
-            <a:off x="5895585" y="5224113"/>
-            <a:ext cx="572836" cy="632242"/>
-          </a:xfrm>
-          <a:prstGeom prst="rect">
-            <a:avLst/>
-          </a:prstGeom>
-        </p:spPr>
-      </p:pic>
-      <p:cxnSp>
-        <p:nvCxnSpPr>
-          <p:cNvPr id="21" name="Gerade Verbindung 20"/>
-          <p:cNvCxnSpPr>
-            <a:stCxn id="8" idx="3"/>
-            <a:endCxn id="20" idx="1"/>
-          </p:cNvCxnSpPr>
-          <p:nvPr/>
-        </p:nvCxnSpPr>
-        <p:spPr>
-          <a:xfrm>
-            <a:off x="5628754" y="5107448"/>
-            <a:ext cx="266831" cy="432786"/>
-          </a:xfrm>
-          <a:prstGeom prst="line">
-            <a:avLst/>
-          </a:prstGeom>
-          <a:ln>
-            <a:solidFill>
-              <a:schemeClr val="accent3"/>
-            </a:solidFill>
-          </a:ln>
-        </p:spPr>
-        <p:style>
-          <a:lnRef idx="1">
-            <a:schemeClr val="accent1"/>
-          </a:lnRef>
-          <a:fillRef idx="0">
-            <a:schemeClr val="accent1"/>
-          </a:fillRef>
-          <a:effectRef idx="0">
-            <a:schemeClr val="accent1"/>
-          </a:effectRef>
-          <a:fontRef idx="minor">
-            <a:schemeClr val="tx1"/>
-          </a:fontRef>
-        </p:style>
-      </p:cxnSp>
-      <p:sp>
-        <p:nvSpPr>
-          <p:cNvPr id="30" name="Textfeld 29"/>
-          <p:cNvSpPr txBox="1"/>
-          <p:nvPr/>
-        </p:nvSpPr>
-        <p:spPr>
-          <a:xfrm>
-            <a:off x="6030047" y="4648599"/>
-            <a:ext cx="1114607" cy="584775"/>
-          </a:xfrm>
-          <a:prstGeom prst="rect">
-            <a:avLst/>
-          </a:prstGeom>
-          <a:noFill/>
-        </p:spPr>
-        <p:txBody>
-          <a:bodyPr wrap="square" rtlCol="0">
-            <a:spAutoFit/>
-          </a:bodyPr>
-          <a:lstStyle/>
-          <a:p>
-            <a:r>
-              <a:rPr lang="de-CH" sz="1600" dirty="0" err="1" smtClean="0"/>
-              <a:t>Temporary</a:t>
-            </a:r>
-            <a:r>
-              <a:rPr lang="de-CH" sz="1600" dirty="0" smtClean="0"/>
-              <a:t> Database</a:t>
-            </a:r>
-            <a:endParaRPr lang="de-CH" sz="1600" dirty="0" smtClean="0"/>
-          </a:p>
-        </p:txBody>
-      </p:sp>
+          </p:spPr>
+          <p:txBody>
+            <a:bodyPr wrap="none" rtlCol="0">
+              <a:spAutoFit/>
+            </a:bodyPr>
+            <a:lstStyle/>
+            <a:p>
+              <a:r>
+                <a:rPr lang="de-CH" sz="1600" dirty="0" smtClean="0"/>
+                <a:t>PC-Client</a:t>
+              </a:r>
+            </a:p>
+          </p:txBody>
+        </p:sp>
+        <p:pic>
+          <p:nvPicPr>
+            <p:cNvPr id="20" name="Grafik 19"/>
+            <p:cNvPicPr>
+              <a:picLocks noChangeAspect="1"/>
+            </p:cNvPicPr>
+            <p:nvPr/>
+          </p:nvPicPr>
+          <p:blipFill>
+            <a:blip r:embed="rId6" cstate="print">
+              <a:extLst>
+                <a:ext uri="{28A0092B-C50C-407E-A947-70E740481C1C}">
+                  <a14:useLocalDpi xmlns:a14="http://schemas.microsoft.com/office/drawing/2010/main" val="0"/>
+                </a:ext>
+              </a:extLst>
+            </a:blip>
+            <a:stretch>
+              <a:fillRect/>
+            </a:stretch>
+          </p:blipFill>
+          <p:spPr>
+            <a:xfrm>
+              <a:off x="5895585" y="5224113"/>
+              <a:ext cx="572836" cy="632242"/>
+            </a:xfrm>
+            <a:prstGeom prst="rect">
+              <a:avLst/>
+            </a:prstGeom>
+          </p:spPr>
+        </p:pic>
+        <p:cxnSp>
+          <p:nvCxnSpPr>
+            <p:cNvPr id="21" name="Gerade Verbindung 20"/>
+            <p:cNvCxnSpPr>
+              <a:stCxn id="8" idx="3"/>
+              <a:endCxn id="20" idx="1"/>
+            </p:cNvCxnSpPr>
+            <p:nvPr/>
+          </p:nvCxnSpPr>
+          <p:spPr>
+            <a:xfrm>
+              <a:off x="5628754" y="5107448"/>
+              <a:ext cx="266831" cy="432786"/>
+            </a:xfrm>
+            <a:prstGeom prst="line">
+              <a:avLst/>
+            </a:prstGeom>
+            <a:ln>
+              <a:solidFill>
+                <a:schemeClr val="accent3"/>
+              </a:solidFill>
+            </a:ln>
+          </p:spPr>
+          <p:style>
+            <a:lnRef idx="1">
+              <a:schemeClr val="accent1"/>
+            </a:lnRef>
+            <a:fillRef idx="0">
+              <a:schemeClr val="accent1"/>
+            </a:fillRef>
+            <a:effectRef idx="0">
+              <a:schemeClr val="accent1"/>
+            </a:effectRef>
+            <a:fontRef idx="minor">
+              <a:schemeClr val="tx1"/>
+            </a:fontRef>
+          </p:style>
+        </p:cxnSp>
+        <p:sp>
+          <p:nvSpPr>
+            <p:cNvPr id="30" name="Textfeld 29"/>
+            <p:cNvSpPr txBox="1"/>
+            <p:nvPr/>
+          </p:nvSpPr>
+          <p:spPr>
+            <a:xfrm>
+              <a:off x="6030047" y="4648599"/>
+              <a:ext cx="1114607" cy="584775"/>
+            </a:xfrm>
+            <a:prstGeom prst="rect">
+              <a:avLst/>
+            </a:prstGeom>
+            <a:noFill/>
+          </p:spPr>
+          <p:txBody>
+            <a:bodyPr wrap="square" rtlCol="0">
+              <a:spAutoFit/>
+            </a:bodyPr>
+            <a:lstStyle/>
+            <a:p>
+              <a:r>
+                <a:rPr lang="de-CH" sz="1600" dirty="0" err="1" smtClean="0"/>
+                <a:t>Temporary</a:t>
+              </a:r>
+              <a:r>
+                <a:rPr lang="de-CH" sz="1600" dirty="0" smtClean="0"/>
+                <a:t> Database</a:t>
+              </a:r>
+            </a:p>
+          </p:txBody>
+        </p:sp>
+      </p:grpSp>
     </p:spTree>
     <p:extLst>
       <p:ext uri="{BB962C8B-B14F-4D97-AF65-F5344CB8AC3E}">

</xml_diff>